<commit_message>
Fix error in SystemB soil. Tidying.
</commit_message>
<xml_diff>
--- a/Tests/Simulation/SoilNitrogenPatch/Presentation1.pptx
+++ b/Tests/Simulation/SoilNitrogenPatch/Presentation1.pptx
@@ -5,8 +5,7 @@
     <p:sldMasterId id="2147483672" r:id="rId1"/>
   </p:sldMasterIdLst>
   <p:sldIdLst>
-    <p:sldId id="256" r:id="rId2"/>
-    <p:sldId id="257" r:id="rId3"/>
+    <p:sldId id="257" r:id="rId2"/>
   </p:sldIdLst>
   <p:sldSz cx="16256000" cy="12192000"/>
   <p:notesSz cx="6858000" cy="9144000"/>
@@ -105,6 +104,11 @@
       </a:defRPr>
     </a:lvl9pPr>
   </p:defaultTextStyle>
+  <p:extLst>
+    <p:ext uri="{EFAFB233-063F-42B5-8137-9DF3F51BA10A}">
+      <p15:sldGuideLst xmlns:p15="http://schemas.microsoft.com/office/powerpoint/2012/main"/>
+    </p:ext>
+  </p:extLst>
 </p:presentation>
 </file>
 
@@ -239,7 +243,7 @@
           <a:p>
             <a:fld id="{89AFE3A0-F5F4-4C49-8209-A6153D033AB8}" type="datetimeFigureOut">
               <a:rPr lang="en-NZ" smtClean="0"/>
-              <a:t>15/02/2023</a:t>
+              <a:t>16/02/2023</a:t>
             </a:fld>
             <a:endParaRPr lang="en-NZ"/>
           </a:p>
@@ -409,7 +413,7 @@
           <a:p>
             <a:fld id="{89AFE3A0-F5F4-4C49-8209-A6153D033AB8}" type="datetimeFigureOut">
               <a:rPr lang="en-NZ" smtClean="0"/>
-              <a:t>15/02/2023</a:t>
+              <a:t>16/02/2023</a:t>
             </a:fld>
             <a:endParaRPr lang="en-NZ"/>
           </a:p>
@@ -589,7 +593,7 @@
           <a:p>
             <a:fld id="{89AFE3A0-F5F4-4C49-8209-A6153D033AB8}" type="datetimeFigureOut">
               <a:rPr lang="en-NZ" smtClean="0"/>
-              <a:t>15/02/2023</a:t>
+              <a:t>16/02/2023</a:t>
             </a:fld>
             <a:endParaRPr lang="en-NZ"/>
           </a:p>
@@ -759,7 +763,7 @@
           <a:p>
             <a:fld id="{89AFE3A0-F5F4-4C49-8209-A6153D033AB8}" type="datetimeFigureOut">
               <a:rPr lang="en-NZ" smtClean="0"/>
-              <a:t>15/02/2023</a:t>
+              <a:t>16/02/2023</a:t>
             </a:fld>
             <a:endParaRPr lang="en-NZ"/>
           </a:p>
@@ -1003,7 +1007,7 @@
           <a:p>
             <a:fld id="{89AFE3A0-F5F4-4C49-8209-A6153D033AB8}" type="datetimeFigureOut">
               <a:rPr lang="en-NZ" smtClean="0"/>
-              <a:t>15/02/2023</a:t>
+              <a:t>16/02/2023</a:t>
             </a:fld>
             <a:endParaRPr lang="en-NZ"/>
           </a:p>
@@ -1235,7 +1239,7 @@
           <a:p>
             <a:fld id="{89AFE3A0-F5F4-4C49-8209-A6153D033AB8}" type="datetimeFigureOut">
               <a:rPr lang="en-NZ" smtClean="0"/>
-              <a:t>15/02/2023</a:t>
+              <a:t>16/02/2023</a:t>
             </a:fld>
             <a:endParaRPr lang="en-NZ"/>
           </a:p>
@@ -1602,7 +1606,7 @@
           <a:p>
             <a:fld id="{89AFE3A0-F5F4-4C49-8209-A6153D033AB8}" type="datetimeFigureOut">
               <a:rPr lang="en-NZ" smtClean="0"/>
-              <a:t>15/02/2023</a:t>
+              <a:t>16/02/2023</a:t>
             </a:fld>
             <a:endParaRPr lang="en-NZ"/>
           </a:p>
@@ -1720,7 +1724,7 @@
           <a:p>
             <a:fld id="{89AFE3A0-F5F4-4C49-8209-A6153D033AB8}" type="datetimeFigureOut">
               <a:rPr lang="en-NZ" smtClean="0"/>
-              <a:t>15/02/2023</a:t>
+              <a:t>16/02/2023</a:t>
             </a:fld>
             <a:endParaRPr lang="en-NZ"/>
           </a:p>
@@ -1815,7 +1819,7 @@
           <a:p>
             <a:fld id="{89AFE3A0-F5F4-4C49-8209-A6153D033AB8}" type="datetimeFigureOut">
               <a:rPr lang="en-NZ" smtClean="0"/>
-              <a:t>15/02/2023</a:t>
+              <a:t>16/02/2023</a:t>
             </a:fld>
             <a:endParaRPr lang="en-NZ"/>
           </a:p>
@@ -2092,7 +2096,7 @@
           <a:p>
             <a:fld id="{89AFE3A0-F5F4-4C49-8209-A6153D033AB8}" type="datetimeFigureOut">
               <a:rPr lang="en-NZ" smtClean="0"/>
-              <a:t>15/02/2023</a:t>
+              <a:t>16/02/2023</a:t>
             </a:fld>
             <a:endParaRPr lang="en-NZ"/>
           </a:p>
@@ -2349,7 +2353,7 @@
           <a:p>
             <a:fld id="{89AFE3A0-F5F4-4C49-8209-A6153D033AB8}" type="datetimeFigureOut">
               <a:rPr lang="en-NZ" smtClean="0"/>
-              <a:t>15/02/2023</a:t>
+              <a:t>16/02/2023</a:t>
             </a:fld>
             <a:endParaRPr lang="en-NZ"/>
           </a:p>
@@ -2562,7 +2566,7 @@
           <a:p>
             <a:fld id="{89AFE3A0-F5F4-4C49-8209-A6153D033AB8}" type="datetimeFigureOut">
               <a:rPr lang="en-NZ" smtClean="0"/>
-              <a:t>15/02/2023</a:t>
+              <a:t>16/02/2023</a:t>
             </a:fld>
             <a:endParaRPr lang="en-NZ"/>
           </a:p>
@@ -2951,587 +2955,6 @@
 </file>
 
 <file path=ppt/slides/slide1.xml><?xml version="1.0" encoding="utf-8"?>
-<p:sld xmlns:a="http://schemas.openxmlformats.org/drawingml/2006/main" xmlns:r="http://schemas.openxmlformats.org/officeDocument/2006/relationships" xmlns:p="http://schemas.openxmlformats.org/presentationml/2006/main">
-  <p:cSld>
-    <p:spTree>
-      <p:nvGrpSpPr>
-        <p:cNvPr id="1" name=""/>
-        <p:cNvGrpSpPr/>
-        <p:nvPr/>
-      </p:nvGrpSpPr>
-      <p:grpSpPr>
-        <a:xfrm>
-          <a:off x="0" y="0"/>
-          <a:ext cx="0" cy="0"/>
-          <a:chOff x="0" y="0"/>
-          <a:chExt cx="0" cy="0"/>
-        </a:xfrm>
-      </p:grpSpPr>
-      <p:sp>
-        <p:nvSpPr>
-          <p:cNvPr id="4" name="Rectangle: Rounded Corners 3">
-            <a:extLst>
-              <a:ext uri="{FF2B5EF4-FFF2-40B4-BE49-F238E27FC236}">
-                <a16:creationId xmlns:a16="http://schemas.microsoft.com/office/drawing/2014/main" id="{54F95544-3A98-A3F5-6388-1F53D91B578A}"/>
-              </a:ext>
-            </a:extLst>
-          </p:cNvPr>
-          <p:cNvSpPr/>
-          <p:nvPr/>
-        </p:nvSpPr>
-        <p:spPr>
-          <a:xfrm>
-            <a:off x="5961447" y="4248616"/>
-            <a:ext cx="2292944" cy="466280"/>
-          </a:xfrm>
-          <a:prstGeom prst="roundRect">
-            <a:avLst/>
-          </a:prstGeom>
-        </p:spPr>
-        <p:style>
-          <a:lnRef idx="2">
-            <a:schemeClr val="accent5">
-              <a:shade val="50000"/>
-            </a:schemeClr>
-          </a:lnRef>
-          <a:fillRef idx="1">
-            <a:schemeClr val="accent5"/>
-          </a:fillRef>
-          <a:effectRef idx="0">
-            <a:schemeClr val="accent5"/>
-          </a:effectRef>
-          <a:fontRef idx="minor">
-            <a:schemeClr val="lt1"/>
-          </a:fontRef>
-        </p:style>
-        <p:txBody>
-          <a:bodyPr rtlCol="0" anchor="ctr"/>
-          <a:lstStyle/>
-          <a:p>
-            <a:pPr algn="ctr"/>
-            <a:r>
-              <a:rPr lang="en-NZ" sz="1013" dirty="0"/>
-              <a:t>Any Model - with </a:t>
-            </a:r>
-            <a:r>
-              <a:rPr lang="en-NZ" sz="1013" dirty="0" err="1"/>
-              <a:t>PseudoPatches</a:t>
-            </a:r>
-            <a:endParaRPr lang="en-NZ" sz="1013" dirty="0"/>
-          </a:p>
-        </p:txBody>
-      </p:sp>
-      <p:sp>
-        <p:nvSpPr>
-          <p:cNvPr id="7" name="Rectangle: Rounded Corners 6">
-            <a:extLst>
-              <a:ext uri="{FF2B5EF4-FFF2-40B4-BE49-F238E27FC236}">
-                <a16:creationId xmlns:a16="http://schemas.microsoft.com/office/drawing/2014/main" id="{824D87B0-68A0-B233-0271-CD7B1BC3657F}"/>
-              </a:ext>
-            </a:extLst>
-          </p:cNvPr>
-          <p:cNvSpPr/>
-          <p:nvPr/>
-        </p:nvSpPr>
-        <p:spPr>
-          <a:xfrm>
-            <a:off x="5934209" y="6736663"/>
-            <a:ext cx="1285073" cy="1019086"/>
-          </a:xfrm>
-          <a:prstGeom prst="roundRect">
-            <a:avLst/>
-          </a:prstGeom>
-        </p:spPr>
-        <p:style>
-          <a:lnRef idx="2">
-            <a:schemeClr val="accent5">
-              <a:shade val="50000"/>
-            </a:schemeClr>
-          </a:lnRef>
-          <a:fillRef idx="1">
-            <a:schemeClr val="accent5"/>
-          </a:fillRef>
-          <a:effectRef idx="0">
-            <a:schemeClr val="accent5"/>
-          </a:effectRef>
-          <a:fontRef idx="minor">
-            <a:schemeClr val="lt1"/>
-          </a:fontRef>
-        </p:style>
-        <p:txBody>
-          <a:bodyPr rtlCol="0" anchor="ctr"/>
-          <a:lstStyle/>
-          <a:p>
-            <a:r>
-              <a:rPr lang="en-NZ" sz="1013" dirty="0"/>
-              <a:t>Nutrient[x]</a:t>
-            </a:r>
-          </a:p>
-          <a:p>
-            <a:pPr marL="160734" indent="-160734">
-              <a:buFont typeface="Arial" panose="020B0604020202020204" pitchFamily="34" charset="0"/>
-              <a:buChar char="•"/>
-            </a:pPr>
-            <a:r>
-              <a:rPr lang="en-NZ" sz="1013" dirty="0"/>
-              <a:t>Areas[x]</a:t>
-            </a:r>
-          </a:p>
-          <a:p>
-            <a:pPr marL="160734" indent="-160734">
-              <a:buFont typeface="Arial" panose="020B0604020202020204" pitchFamily="34" charset="0"/>
-              <a:buChar char="•"/>
-            </a:pPr>
-            <a:r>
-              <a:rPr lang="en-NZ" sz="1013" dirty="0" err="1"/>
-              <a:t>UreaEachPatch</a:t>
-            </a:r>
-            <a:r>
-              <a:rPr lang="en-NZ" sz="1013" dirty="0"/>
-              <a:t>[x]</a:t>
-            </a:r>
-          </a:p>
-          <a:p>
-            <a:pPr marL="160734" indent="-160734">
-              <a:buFont typeface="Arial" panose="020B0604020202020204" pitchFamily="34" charset="0"/>
-              <a:buChar char="•"/>
-            </a:pPr>
-            <a:endParaRPr lang="en-NZ" sz="1013" dirty="0"/>
-          </a:p>
-          <a:p>
-            <a:pPr marL="160734" indent="-160734">
-              <a:buFont typeface="Arial" panose="020B0604020202020204" pitchFamily="34" charset="0"/>
-              <a:buChar char="•"/>
-            </a:pPr>
-            <a:endParaRPr lang="en-NZ" sz="1013" dirty="0"/>
-          </a:p>
-        </p:txBody>
-      </p:sp>
-      <p:sp>
-        <p:nvSpPr>
-          <p:cNvPr id="8" name="Rectangle: Rounded Corners 7">
-            <a:extLst>
-              <a:ext uri="{FF2B5EF4-FFF2-40B4-BE49-F238E27FC236}">
-                <a16:creationId xmlns:a16="http://schemas.microsoft.com/office/drawing/2014/main" id="{2DD66974-B445-34F2-3F80-79CB41F69411}"/>
-              </a:ext>
-            </a:extLst>
-          </p:cNvPr>
-          <p:cNvSpPr/>
-          <p:nvPr/>
-        </p:nvSpPr>
-        <p:spPr>
-          <a:xfrm>
-            <a:off x="6009518" y="5457615"/>
-            <a:ext cx="1134454" cy="466280"/>
-          </a:xfrm>
-          <a:prstGeom prst="roundRect">
-            <a:avLst/>
-          </a:prstGeom>
-        </p:spPr>
-        <p:style>
-          <a:lnRef idx="2">
-            <a:schemeClr val="accent5">
-              <a:shade val="50000"/>
-            </a:schemeClr>
-          </a:lnRef>
-          <a:fillRef idx="1">
-            <a:schemeClr val="accent5"/>
-          </a:fillRef>
-          <a:effectRef idx="0">
-            <a:schemeClr val="accent5"/>
-          </a:effectRef>
-          <a:fontRef idx="minor">
-            <a:schemeClr val="lt1"/>
-          </a:fontRef>
-        </p:style>
-        <p:txBody>
-          <a:bodyPr rtlCol="0" anchor="ctr"/>
-          <a:lstStyle/>
-          <a:p>
-            <a:pPr algn="ctr"/>
-            <a:r>
-              <a:rPr lang="en-NZ" sz="1013" dirty="0" err="1"/>
-              <a:t>PatchManager</a:t>
-            </a:r>
-            <a:endParaRPr lang="en-NZ" sz="1013" dirty="0"/>
-          </a:p>
-        </p:txBody>
-      </p:sp>
-      <p:cxnSp>
-        <p:nvCxnSpPr>
-          <p:cNvPr id="10" name="Straight Arrow Connector 9">
-            <a:extLst>
-              <a:ext uri="{FF2B5EF4-FFF2-40B4-BE49-F238E27FC236}">
-                <a16:creationId xmlns:a16="http://schemas.microsoft.com/office/drawing/2014/main" id="{610AFBB5-EFB6-C02B-0920-6C93FD58FB88}"/>
-              </a:ext>
-            </a:extLst>
-          </p:cNvPr>
-          <p:cNvCxnSpPr/>
-          <p:nvPr/>
-        </p:nvCxnSpPr>
-        <p:spPr>
-          <a:xfrm>
-            <a:off x="6139307" y="4737765"/>
-            <a:ext cx="0" cy="677788"/>
-          </a:xfrm>
-          <a:prstGeom prst="straightConnector1">
-            <a:avLst/>
-          </a:prstGeom>
-          <a:ln w="25400">
-            <a:tailEnd type="stealth" w="lg" len="lg"/>
-          </a:ln>
-        </p:spPr>
-        <p:style>
-          <a:lnRef idx="1">
-            <a:schemeClr val="accent1"/>
-          </a:lnRef>
-          <a:fillRef idx="0">
-            <a:schemeClr val="accent1"/>
-          </a:fillRef>
-          <a:effectRef idx="0">
-            <a:schemeClr val="accent1"/>
-          </a:effectRef>
-          <a:fontRef idx="minor">
-            <a:schemeClr val="tx1"/>
-          </a:fontRef>
-        </p:style>
-      </p:cxnSp>
-      <p:sp>
-        <p:nvSpPr>
-          <p:cNvPr id="11" name="TextBox 10">
-            <a:extLst>
-              <a:ext uri="{FF2B5EF4-FFF2-40B4-BE49-F238E27FC236}">
-                <a16:creationId xmlns:a16="http://schemas.microsoft.com/office/drawing/2014/main" id="{727EDC2A-D556-7126-7809-2927FAE360A3}"/>
-              </a:ext>
-            </a:extLst>
-          </p:cNvPr>
-          <p:cNvSpPr txBox="1"/>
-          <p:nvPr/>
-        </p:nvSpPr>
-        <p:spPr>
-          <a:xfrm>
-            <a:off x="5782769" y="4913329"/>
-            <a:ext cx="439544" cy="248209"/>
-          </a:xfrm>
-          <a:prstGeom prst="rect">
-            <a:avLst/>
-          </a:prstGeom>
-          <a:noFill/>
-        </p:spPr>
-        <p:txBody>
-          <a:bodyPr wrap="none" rtlCol="0">
-            <a:spAutoFit/>
-          </a:bodyPr>
-          <a:lstStyle/>
-          <a:p>
-            <a:r>
-              <a:rPr lang="en-NZ" sz="1013" dirty="0"/>
-              <a:t>Urea</a:t>
-            </a:r>
-          </a:p>
-        </p:txBody>
-      </p:sp>
-      <p:cxnSp>
-        <p:nvCxnSpPr>
-          <p:cNvPr id="12" name="Straight Arrow Connector 11">
-            <a:extLst>
-              <a:ext uri="{FF2B5EF4-FFF2-40B4-BE49-F238E27FC236}">
-                <a16:creationId xmlns:a16="http://schemas.microsoft.com/office/drawing/2014/main" id="{92126192-3EEE-5140-6E79-20D4B18DC8BF}"/>
-              </a:ext>
-            </a:extLst>
-          </p:cNvPr>
-          <p:cNvCxnSpPr/>
-          <p:nvPr/>
-        </p:nvCxnSpPr>
-        <p:spPr>
-          <a:xfrm>
-            <a:off x="6139307" y="5988826"/>
-            <a:ext cx="0" cy="677788"/>
-          </a:xfrm>
-          <a:prstGeom prst="straightConnector1">
-            <a:avLst/>
-          </a:prstGeom>
-          <a:ln w="25400">
-            <a:tailEnd type="stealth" w="lg" len="lg"/>
-          </a:ln>
-        </p:spPr>
-        <p:style>
-          <a:lnRef idx="1">
-            <a:schemeClr val="accent1"/>
-          </a:lnRef>
-          <a:fillRef idx="0">
-            <a:schemeClr val="accent1"/>
-          </a:fillRef>
-          <a:effectRef idx="0">
-            <a:schemeClr val="accent1"/>
-          </a:effectRef>
-          <a:fontRef idx="minor">
-            <a:schemeClr val="tx1"/>
-          </a:fontRef>
-        </p:style>
-      </p:cxnSp>
-      <p:sp>
-        <p:nvSpPr>
-          <p:cNvPr id="13" name="TextBox 12">
-            <a:extLst>
-              <a:ext uri="{FF2B5EF4-FFF2-40B4-BE49-F238E27FC236}">
-                <a16:creationId xmlns:a16="http://schemas.microsoft.com/office/drawing/2014/main" id="{F54AC793-7EDA-8694-36F4-5E83A065FE6D}"/>
-              </a:ext>
-            </a:extLst>
-          </p:cNvPr>
-          <p:cNvSpPr txBox="1"/>
-          <p:nvPr/>
-        </p:nvSpPr>
-        <p:spPr>
-          <a:xfrm>
-            <a:off x="5109795" y="6145940"/>
-            <a:ext cx="1122423" cy="559961"/>
-          </a:xfrm>
-          <a:prstGeom prst="rect">
-            <a:avLst/>
-          </a:prstGeom>
-          <a:noFill/>
-        </p:spPr>
-        <p:txBody>
-          <a:bodyPr wrap="none" rtlCol="0">
-            <a:spAutoFit/>
-          </a:bodyPr>
-          <a:lstStyle/>
-          <a:p>
-            <a:r>
-              <a:rPr lang="en-NZ" sz="1013" dirty="0" err="1"/>
-              <a:t>UreaEachPatch</a:t>
-            </a:r>
-            <a:r>
-              <a:rPr lang="en-NZ" sz="1013" dirty="0"/>
-              <a:t>[x]</a:t>
-            </a:r>
-          </a:p>
-          <a:p>
-            <a:r>
-              <a:rPr lang="en-NZ" sz="1013" dirty="0"/>
-              <a:t>Areas[x]</a:t>
-            </a:r>
-          </a:p>
-          <a:p>
-            <a:endParaRPr lang="en-NZ" sz="1013" dirty="0"/>
-          </a:p>
-        </p:txBody>
-      </p:sp>
-      <p:cxnSp>
-        <p:nvCxnSpPr>
-          <p:cNvPr id="14" name="Straight Arrow Connector 13">
-            <a:extLst>
-              <a:ext uri="{FF2B5EF4-FFF2-40B4-BE49-F238E27FC236}">
-                <a16:creationId xmlns:a16="http://schemas.microsoft.com/office/drawing/2014/main" id="{4027E84A-5CCC-371B-05B1-7160E159E86D}"/>
-              </a:ext>
-            </a:extLst>
-          </p:cNvPr>
-          <p:cNvCxnSpPr>
-            <a:cxnSpLocks/>
-          </p:cNvCxnSpPr>
-          <p:nvPr/>
-        </p:nvCxnSpPr>
-        <p:spPr>
-          <a:xfrm flipV="1">
-            <a:off x="6412068" y="4737765"/>
-            <a:ext cx="0" cy="677788"/>
-          </a:xfrm>
-          <a:prstGeom prst="straightConnector1">
-            <a:avLst/>
-          </a:prstGeom>
-          <a:ln w="25400">
-            <a:tailEnd type="stealth" w="lg" len="lg"/>
-          </a:ln>
-        </p:spPr>
-        <p:style>
-          <a:lnRef idx="1">
-            <a:schemeClr val="accent1"/>
-          </a:lnRef>
-          <a:fillRef idx="0">
-            <a:schemeClr val="accent1"/>
-          </a:fillRef>
-          <a:effectRef idx="0">
-            <a:schemeClr val="accent1"/>
-          </a:effectRef>
-          <a:fontRef idx="minor">
-            <a:schemeClr val="tx1"/>
-          </a:fontRef>
-        </p:style>
-      </p:cxnSp>
-      <p:cxnSp>
-        <p:nvCxnSpPr>
-          <p:cNvPr id="15" name="Straight Arrow Connector 14">
-            <a:extLst>
-              <a:ext uri="{FF2B5EF4-FFF2-40B4-BE49-F238E27FC236}">
-                <a16:creationId xmlns:a16="http://schemas.microsoft.com/office/drawing/2014/main" id="{851CD70F-7F3D-5C03-BF3F-F2E9871C30BE}"/>
-              </a:ext>
-            </a:extLst>
-          </p:cNvPr>
-          <p:cNvCxnSpPr>
-            <a:cxnSpLocks/>
-          </p:cNvCxnSpPr>
-          <p:nvPr/>
-        </p:nvCxnSpPr>
-        <p:spPr>
-          <a:xfrm flipV="1">
-            <a:off x="6412068" y="5988826"/>
-            <a:ext cx="0" cy="677788"/>
-          </a:xfrm>
-          <a:prstGeom prst="straightConnector1">
-            <a:avLst/>
-          </a:prstGeom>
-          <a:ln w="25400">
-            <a:tailEnd type="stealth" w="lg" len="lg"/>
-          </a:ln>
-        </p:spPr>
-        <p:style>
-          <a:lnRef idx="1">
-            <a:schemeClr val="accent1"/>
-          </a:lnRef>
-          <a:fillRef idx="0">
-            <a:schemeClr val="accent1"/>
-          </a:fillRef>
-          <a:effectRef idx="0">
-            <a:schemeClr val="accent1"/>
-          </a:effectRef>
-          <a:fontRef idx="minor">
-            <a:schemeClr val="tx1"/>
-          </a:fontRef>
-        </p:style>
-      </p:cxnSp>
-      <p:sp>
-        <p:nvSpPr>
-          <p:cNvPr id="16" name="TextBox 15">
-            <a:extLst>
-              <a:ext uri="{FF2B5EF4-FFF2-40B4-BE49-F238E27FC236}">
-                <a16:creationId xmlns:a16="http://schemas.microsoft.com/office/drawing/2014/main" id="{E082787D-99D2-8C29-324B-A64181263E2A}"/>
-              </a:ext>
-            </a:extLst>
-          </p:cNvPr>
-          <p:cNvSpPr txBox="1"/>
-          <p:nvPr/>
-        </p:nvSpPr>
-        <p:spPr>
-          <a:xfrm>
-            <a:off x="6452983" y="4962678"/>
-            <a:ext cx="2879314" cy="248209"/>
-          </a:xfrm>
-          <a:prstGeom prst="rect">
-            <a:avLst/>
-          </a:prstGeom>
-          <a:noFill/>
-        </p:spPr>
-        <p:txBody>
-          <a:bodyPr wrap="none" rtlCol="0">
-            <a:spAutoFit/>
-          </a:bodyPr>
-          <a:lstStyle/>
-          <a:p>
-            <a:r>
-              <a:rPr lang="en-NZ" sz="1013" dirty="0"/>
-              <a:t>Urea (kg N /ha – area-weighted across whole zone)</a:t>
-            </a:r>
-          </a:p>
-        </p:txBody>
-      </p:sp>
-      <p:sp>
-        <p:nvSpPr>
-          <p:cNvPr id="17" name="TextBox 16">
-            <a:extLst>
-              <a:ext uri="{FF2B5EF4-FFF2-40B4-BE49-F238E27FC236}">
-                <a16:creationId xmlns:a16="http://schemas.microsoft.com/office/drawing/2014/main" id="{29A3C8A9-F577-FC36-E4B8-A2262AA46C7A}"/>
-              </a:ext>
-            </a:extLst>
-          </p:cNvPr>
-          <p:cNvSpPr txBox="1"/>
-          <p:nvPr/>
-        </p:nvSpPr>
-        <p:spPr>
-          <a:xfrm>
-            <a:off x="6452982" y="6147242"/>
-            <a:ext cx="2364750" cy="559961"/>
-          </a:xfrm>
-          <a:prstGeom prst="rect">
-            <a:avLst/>
-          </a:prstGeom>
-          <a:noFill/>
-        </p:spPr>
-        <p:txBody>
-          <a:bodyPr wrap="none" rtlCol="0">
-            <a:spAutoFit/>
-          </a:bodyPr>
-          <a:lstStyle/>
-          <a:p>
-            <a:r>
-              <a:rPr lang="en-NZ" sz="1013" dirty="0" err="1"/>
-              <a:t>UreaEachPatch</a:t>
-            </a:r>
-            <a:r>
-              <a:rPr lang="en-NZ" sz="1013" dirty="0"/>
-              <a:t>[x] (kg N /ha within patch)</a:t>
-            </a:r>
-          </a:p>
-          <a:p>
-            <a:r>
-              <a:rPr lang="en-NZ" sz="1013" dirty="0"/>
-              <a:t>Areas[x] (ha – area of patch)</a:t>
-            </a:r>
-          </a:p>
-          <a:p>
-            <a:endParaRPr lang="en-NZ" sz="1013" dirty="0"/>
-          </a:p>
-        </p:txBody>
-      </p:sp>
-      <p:sp>
-        <p:nvSpPr>
-          <p:cNvPr id="18" name="TextBox 17">
-            <a:extLst>
-              <a:ext uri="{FF2B5EF4-FFF2-40B4-BE49-F238E27FC236}">
-                <a16:creationId xmlns:a16="http://schemas.microsoft.com/office/drawing/2014/main" id="{597781E1-E0D5-B44C-1C7D-6DBEB972EFAE}"/>
-              </a:ext>
-            </a:extLst>
-          </p:cNvPr>
-          <p:cNvSpPr txBox="1"/>
-          <p:nvPr/>
-        </p:nvSpPr>
-        <p:spPr>
-          <a:xfrm>
-            <a:off x="7174335" y="5586881"/>
-            <a:ext cx="2029723" cy="248209"/>
-          </a:xfrm>
-          <a:prstGeom prst="rect">
-            <a:avLst/>
-          </a:prstGeom>
-          <a:noFill/>
-        </p:spPr>
-        <p:txBody>
-          <a:bodyPr wrap="none" rtlCol="0">
-            <a:spAutoFit/>
-          </a:bodyPr>
-          <a:lstStyle/>
-          <a:p>
-            <a:r>
-              <a:rPr lang="en-NZ" sz="1013" dirty="0"/>
-              <a:t>Calculates area-weighted kg N /ha)</a:t>
-            </a:r>
-          </a:p>
-        </p:txBody>
-      </p:sp>
-    </p:spTree>
-    <p:extLst>
-      <p:ext uri="{BB962C8B-B14F-4D97-AF65-F5344CB8AC3E}">
-        <p14:creationId xmlns:p14="http://schemas.microsoft.com/office/powerpoint/2010/main" val="3281196002"/>
-      </p:ext>
-    </p:extLst>
-  </p:cSld>
-  <p:clrMapOvr>
-    <a:masterClrMapping/>
-  </p:clrMapOvr>
-</p:sld>
-</file>
-
-<file path=ppt/slides/slide2.xml><?xml version="1.0" encoding="utf-8"?>
 <p:sld xmlns:a="http://schemas.openxmlformats.org/drawingml/2006/main" xmlns:r="http://schemas.openxmlformats.org/officeDocument/2006/relationships" xmlns:p="http://schemas.openxmlformats.org/presentationml/2006/main">
   <p:cSld>
     <p:spTree>

</xml_diff>